<commit_message>
tex update + MC res
</commit_message>
<xml_diff>
--- a/results/tex/img/CW_arch.pptx
+++ b/results/tex/img/CW_arch.pptx
@@ -104,6 +104,11 @@
       </a:defRPr>
     </a:lvl9pPr>
   </p:defaultTextStyle>
+  <p:extLst>
+    <p:ext uri="{EFAFB233-063F-42B5-8137-9DF3F51BA10A}">
+      <p15:sldGuideLst xmlns:p15="http://schemas.microsoft.com/office/powerpoint/2012/main"/>
+    </p:ext>
+  </p:extLst>
 </p:presentation>
 </file>
 
@@ -238,7 +243,7 @@
           <a:p>
             <a:fld id="{1C5A0285-CF71-E14F-8A6B-6244E4F27662}" type="datetimeFigureOut">
               <a:rPr lang="en-US" smtClean="0"/>
-              <a:t>2/6/23</a:t>
+              <a:t>2/7/23</a:t>
             </a:fld>
             <a:endParaRPr lang="en-US"/>
           </a:p>
@@ -408,7 +413,7 @@
           <a:p>
             <a:fld id="{1C5A0285-CF71-E14F-8A6B-6244E4F27662}" type="datetimeFigureOut">
               <a:rPr lang="en-US" smtClean="0"/>
-              <a:t>2/6/23</a:t>
+              <a:t>2/7/23</a:t>
             </a:fld>
             <a:endParaRPr lang="en-US"/>
           </a:p>
@@ -588,7 +593,7 @@
           <a:p>
             <a:fld id="{1C5A0285-CF71-E14F-8A6B-6244E4F27662}" type="datetimeFigureOut">
               <a:rPr lang="en-US" smtClean="0"/>
-              <a:t>2/6/23</a:t>
+              <a:t>2/7/23</a:t>
             </a:fld>
             <a:endParaRPr lang="en-US"/>
           </a:p>
@@ -758,7 +763,7 @@
           <a:p>
             <a:fld id="{1C5A0285-CF71-E14F-8A6B-6244E4F27662}" type="datetimeFigureOut">
               <a:rPr lang="en-US" smtClean="0"/>
-              <a:t>2/6/23</a:t>
+              <a:t>2/7/23</a:t>
             </a:fld>
             <a:endParaRPr lang="en-US"/>
           </a:p>
@@ -1002,7 +1007,7 @@
           <a:p>
             <a:fld id="{1C5A0285-CF71-E14F-8A6B-6244E4F27662}" type="datetimeFigureOut">
               <a:rPr lang="en-US" smtClean="0"/>
-              <a:t>2/6/23</a:t>
+              <a:t>2/7/23</a:t>
             </a:fld>
             <a:endParaRPr lang="en-US"/>
           </a:p>
@@ -1234,7 +1239,7 @@
           <a:p>
             <a:fld id="{1C5A0285-CF71-E14F-8A6B-6244E4F27662}" type="datetimeFigureOut">
               <a:rPr lang="en-US" smtClean="0"/>
-              <a:t>2/6/23</a:t>
+              <a:t>2/7/23</a:t>
             </a:fld>
             <a:endParaRPr lang="en-US"/>
           </a:p>
@@ -1601,7 +1606,7 @@
           <a:p>
             <a:fld id="{1C5A0285-CF71-E14F-8A6B-6244E4F27662}" type="datetimeFigureOut">
               <a:rPr lang="en-US" smtClean="0"/>
-              <a:t>2/6/23</a:t>
+              <a:t>2/7/23</a:t>
             </a:fld>
             <a:endParaRPr lang="en-US"/>
           </a:p>
@@ -1719,7 +1724,7 @@
           <a:p>
             <a:fld id="{1C5A0285-CF71-E14F-8A6B-6244E4F27662}" type="datetimeFigureOut">
               <a:rPr lang="en-US" smtClean="0"/>
-              <a:t>2/6/23</a:t>
+              <a:t>2/7/23</a:t>
             </a:fld>
             <a:endParaRPr lang="en-US"/>
           </a:p>
@@ -1814,7 +1819,7 @@
           <a:p>
             <a:fld id="{1C5A0285-CF71-E14F-8A6B-6244E4F27662}" type="datetimeFigureOut">
               <a:rPr lang="en-US" smtClean="0"/>
-              <a:t>2/6/23</a:t>
+              <a:t>2/7/23</a:t>
             </a:fld>
             <a:endParaRPr lang="en-US"/>
           </a:p>
@@ -2091,7 +2096,7 @@
           <a:p>
             <a:fld id="{1C5A0285-CF71-E14F-8A6B-6244E4F27662}" type="datetimeFigureOut">
               <a:rPr lang="en-US" smtClean="0"/>
-              <a:t>2/6/23</a:t>
+              <a:t>2/7/23</a:t>
             </a:fld>
             <a:endParaRPr lang="en-US"/>
           </a:p>
@@ -2348,7 +2353,7 @@
           <a:p>
             <a:fld id="{1C5A0285-CF71-E14F-8A6B-6244E4F27662}" type="datetimeFigureOut">
               <a:rPr lang="en-US" smtClean="0"/>
-              <a:t>2/6/23</a:t>
+              <a:t>2/7/23</a:t>
             </a:fld>
             <a:endParaRPr lang="en-US"/>
           </a:p>
@@ -2561,7 +2566,7 @@
           <a:p>
             <a:fld id="{1C5A0285-CF71-E14F-8A6B-6244E4F27662}" type="datetimeFigureOut">
               <a:rPr lang="en-US" smtClean="0"/>
-              <a:t>2/6/23</a:t>
+              <a:t>2/7/23</a:t>
             </a:fld>
             <a:endParaRPr lang="en-US"/>
           </a:p>
@@ -4202,8 +4207,8 @@
           </p:style>
         </p:cxnSp>
       </p:grpSp>
-      <mc:AlternateContent xmlns:mc="http://schemas.openxmlformats.org/markup-compatibility/2006">
-        <mc:Choice xmlns:a14="http://schemas.microsoft.com/office/drawing/2010/main" Requires="a14">
+      <mc:AlternateContent xmlns:mc="http://schemas.openxmlformats.org/markup-compatibility/2006" xmlns:a14="http://schemas.microsoft.com/office/drawing/2010/main">
+        <mc:Choice Requires="a14">
           <p:sp>
             <p:nvSpPr>
               <p:cNvPr id="33" name="Rettangolo con angoli arrotondati 32">
@@ -4305,7 +4310,7 @@
             </p:txBody>
           </p:sp>
         </mc:Choice>
-        <mc:Fallback>
+        <mc:Fallback xmlns="">
           <p:sp>
             <p:nvSpPr>
               <p:cNvPr id="33" name="Rettangolo con angoli arrotondati 32">
@@ -4359,8 +4364,8 @@
           </p:sp>
         </mc:Fallback>
       </mc:AlternateContent>
-      <mc:AlternateContent xmlns:mc="http://schemas.openxmlformats.org/markup-compatibility/2006">
-        <mc:Choice xmlns:a14="http://schemas.microsoft.com/office/drawing/2010/main" Requires="a14">
+      <mc:AlternateContent xmlns:mc="http://schemas.openxmlformats.org/markup-compatibility/2006" xmlns:a14="http://schemas.microsoft.com/office/drawing/2010/main">
+        <mc:Choice Requires="a14">
           <p:sp>
             <p:nvSpPr>
               <p:cNvPr id="34" name="Rettangolo con angoli arrotondati 33">
@@ -4462,7 +4467,7 @@
             </p:txBody>
           </p:sp>
         </mc:Choice>
-        <mc:Fallback>
+        <mc:Fallback xmlns="">
           <p:sp>
             <p:nvSpPr>
               <p:cNvPr id="34" name="Rettangolo con angoli arrotondati 33">
@@ -5730,8 +5735,8 @@
         </p:nvCxnSpPr>
         <p:spPr>
           <a:xfrm flipV="1">
-            <a:off x="2994024" y="4788179"/>
-            <a:ext cx="1282789" cy="659682"/>
+            <a:off x="2994024" y="5442603"/>
+            <a:ext cx="1316919" cy="5259"/>
           </a:xfrm>
           <a:prstGeom prst="line">
             <a:avLst/>
@@ -5828,8 +5833,8 @@
         </p:nvCxnSpPr>
         <p:spPr>
           <a:xfrm>
-            <a:off x="5597502" y="4788179"/>
-            <a:ext cx="1180862" cy="659680"/>
+            <a:off x="5631633" y="5442603"/>
+            <a:ext cx="1146731" cy="5257"/>
           </a:xfrm>
           <a:prstGeom prst="line">
             <a:avLst/>
@@ -5978,7 +5983,7 @@
         </p:nvSpPr>
         <p:spPr>
           <a:xfrm>
-            <a:off x="4276812" y="4542015"/>
+            <a:off x="4310943" y="5196438"/>
             <a:ext cx="1320690" cy="492329"/>
           </a:xfrm>
           <a:prstGeom prst="roundRect">
@@ -6022,58 +6027,252 @@
           </a:p>
         </p:txBody>
       </p:sp>
-      <p:cxnSp>
-        <p:nvCxnSpPr>
-          <p:cNvPr id="63" name="Connettore 1 62">
+      <p:sp>
+        <p:nvSpPr>
+          <p:cNvPr id="71" name="CasellaDiTesto 70">
             <a:extLst>
               <a:ext uri="{FF2B5EF4-FFF2-40B4-BE49-F238E27FC236}">
-                <a16:creationId xmlns:a16="http://schemas.microsoft.com/office/drawing/2014/main" id="{07955746-78E7-A796-2F9E-B7D4029A567E}"/>
+                <a16:creationId xmlns:a16="http://schemas.microsoft.com/office/drawing/2014/main" id="{AF8BB8EE-BC7C-0F8F-AD3C-5A7C6105108A}"/>
               </a:ext>
             </a:extLst>
           </p:cNvPr>
-          <p:cNvCxnSpPr>
-            <a:cxnSpLocks/>
-            <a:stCxn id="53" idx="3"/>
-            <a:endCxn id="58" idx="2"/>
-          </p:cNvCxnSpPr>
+          <p:cNvSpPr txBox="1"/>
           <p:nvPr/>
-        </p:nvCxnSpPr>
+        </p:nvSpPr>
+        <p:spPr>
+          <a:xfrm>
+            <a:off x="170104" y="286540"/>
+            <a:ext cx="421910" cy="584775"/>
+          </a:xfrm>
+          <a:prstGeom prst="rect">
+            <a:avLst/>
+          </a:prstGeom>
+          <a:noFill/>
+        </p:spPr>
+        <p:txBody>
+          <a:bodyPr wrap="none" rtlCol="0">
+            <a:spAutoFit/>
+          </a:bodyPr>
+          <a:lstStyle/>
+          <a:p>
+            <a:r>
+              <a:rPr lang="en-US" sz="3200" dirty="0"/>
+              <a:t>A</a:t>
+            </a:r>
+          </a:p>
+        </p:txBody>
+      </p:sp>
+      <p:sp>
+        <p:nvSpPr>
+          <p:cNvPr id="79" name="CasellaDiTesto 78">
+            <a:extLst>
+              <a:ext uri="{FF2B5EF4-FFF2-40B4-BE49-F238E27FC236}">
+                <a16:creationId xmlns:a16="http://schemas.microsoft.com/office/drawing/2014/main" id="{CA9C32B8-D382-93BA-2BDC-FBE7E635F0A9}"/>
+              </a:ext>
+            </a:extLst>
+          </p:cNvPr>
+          <p:cNvSpPr txBox="1"/>
+          <p:nvPr/>
+        </p:nvSpPr>
+        <p:spPr>
+          <a:xfrm>
+            <a:off x="111775" y="3785983"/>
+            <a:ext cx="407484" cy="584775"/>
+          </a:xfrm>
+          <a:prstGeom prst="rect">
+            <a:avLst/>
+          </a:prstGeom>
+          <a:noFill/>
+        </p:spPr>
+        <p:txBody>
+          <a:bodyPr wrap="none" rtlCol="0">
+            <a:spAutoFit/>
+          </a:bodyPr>
+          <a:lstStyle/>
+          <a:p>
+            <a:pPr/>
+            <a:r>
+              <a:rPr lang="en-US" sz="3200" dirty="0"/>
+              <a:t>B</a:t>
+            </a:r>
+          </a:p>
+        </p:txBody>
+      </p:sp>
+      <p:sp>
+        <p:nvSpPr>
+          <p:cNvPr id="49" name="Figura a mano libera 48">
+            <a:extLst>
+              <a:ext uri="{FF2B5EF4-FFF2-40B4-BE49-F238E27FC236}">
+                <a16:creationId xmlns:a16="http://schemas.microsoft.com/office/drawing/2014/main" id="{DC5BBE37-C1A7-227D-BBFF-C3EAAE3C6F70}"/>
+              </a:ext>
+            </a:extLst>
+          </p:cNvPr>
+          <p:cNvSpPr/>
+          <p:nvPr/>
+        </p:nvSpPr>
         <p:spPr>
           <a:xfrm flipV="1">
-            <a:off x="2994024" y="5447859"/>
-            <a:ext cx="3784341" cy="2"/>
+            <a:off x="3006714" y="4672073"/>
+            <a:ext cx="3769589" cy="770527"/>
           </a:xfrm>
-          <a:prstGeom prst="line">
+          <a:custGeom>
             <a:avLst/>
-          </a:prstGeom>
+            <a:gdLst>
+              <a:gd name="connsiteX0" fmla="*/ 0 w 2003258"/>
+              <a:gd name="connsiteY0" fmla="*/ 0 h 930810"/>
+              <a:gd name="connsiteX1" fmla="*/ 294774 w 2003258"/>
+              <a:gd name="connsiteY1" fmla="*/ 794084 h 930810"/>
+              <a:gd name="connsiteX2" fmla="*/ 661737 w 2003258"/>
+              <a:gd name="connsiteY2" fmla="*/ 896352 h 930810"/>
+              <a:gd name="connsiteX3" fmla="*/ 1726532 w 2003258"/>
+              <a:gd name="connsiteY3" fmla="*/ 421105 h 930810"/>
+              <a:gd name="connsiteX4" fmla="*/ 2003258 w 2003258"/>
+              <a:gd name="connsiteY4" fmla="*/ 6015 h 930810"/>
+            </a:gdLst>
+            <a:ahLst/>
+            <a:cxnLst>
+              <a:cxn ang="0">
+                <a:pos x="connsiteX0" y="connsiteY0"/>
+              </a:cxn>
+              <a:cxn ang="0">
+                <a:pos x="connsiteX1" y="connsiteY1"/>
+              </a:cxn>
+              <a:cxn ang="0">
+                <a:pos x="connsiteX2" y="connsiteY2"/>
+              </a:cxn>
+              <a:cxn ang="0">
+                <a:pos x="connsiteX3" y="connsiteY3"/>
+              </a:cxn>
+              <a:cxn ang="0">
+                <a:pos x="connsiteX4" y="connsiteY4"/>
+              </a:cxn>
+            </a:cxnLst>
+            <a:rect l="l" t="t" r="r" b="b"/>
+            <a:pathLst>
+              <a:path w="2003258" h="930810">
+                <a:moveTo>
+                  <a:pt x="0" y="0"/>
+                </a:moveTo>
+                <a:cubicBezTo>
+                  <a:pt x="92242" y="322346"/>
+                  <a:pt x="184485" y="644692"/>
+                  <a:pt x="294774" y="794084"/>
+                </a:cubicBezTo>
+                <a:cubicBezTo>
+                  <a:pt x="405063" y="943476"/>
+                  <a:pt x="423111" y="958515"/>
+                  <a:pt x="661737" y="896352"/>
+                </a:cubicBezTo>
+                <a:cubicBezTo>
+                  <a:pt x="900363" y="834189"/>
+                  <a:pt x="1502945" y="569495"/>
+                  <a:pt x="1726532" y="421105"/>
+                </a:cubicBezTo>
+                <a:cubicBezTo>
+                  <a:pt x="1950119" y="272716"/>
+                  <a:pt x="1976688" y="139365"/>
+                  <a:pt x="2003258" y="6015"/>
+                </a:cubicBezTo>
+              </a:path>
+            </a:pathLst>
+          </a:custGeom>
           <a:ln w="28575">
+            <a:solidFill>
+              <a:schemeClr val="accent2"/>
+            </a:solidFill>
             <a:headEnd type="none" w="med" len="med"/>
             <a:tailEnd type="none" w="med" len="med"/>
           </a:ln>
         </p:spPr>
         <p:style>
           <a:lnRef idx="1">
-            <a:schemeClr val="accent2"/>
+            <a:schemeClr val="dk1"/>
           </a:lnRef>
           <a:fillRef idx="0">
-            <a:schemeClr val="accent2"/>
+            <a:schemeClr val="dk1"/>
           </a:fillRef>
           <a:effectRef idx="0">
-            <a:schemeClr val="accent2"/>
+            <a:schemeClr val="dk1"/>
           </a:effectRef>
           <a:fontRef idx="minor">
             <a:schemeClr val="tx1"/>
           </a:fontRef>
         </p:style>
-      </p:cxnSp>
+        <p:txBody>
+          <a:bodyPr rtlCol="0" anchor="ctr"/>
+          <a:lstStyle/>
+          <a:p>
+            <a:pPr algn="ctr"/>
+            <a:endParaRPr lang="en-US" dirty="0">
+              <a:solidFill>
+                <a:schemeClr val="accent2"/>
+              </a:solidFill>
+            </a:endParaRPr>
+          </a:p>
+        </p:txBody>
+      </p:sp>
+      <p:sp>
+        <p:nvSpPr>
+          <p:cNvPr id="69" name="Rettangolo con angoli arrotondati 68">
+            <a:extLst>
+              <a:ext uri="{FF2B5EF4-FFF2-40B4-BE49-F238E27FC236}">
+                <a16:creationId xmlns:a16="http://schemas.microsoft.com/office/drawing/2014/main" id="{BB5F3386-EF96-2EFE-9E6E-CF6212E911AC}"/>
+              </a:ext>
+            </a:extLst>
+          </p:cNvPr>
+          <p:cNvSpPr/>
+          <p:nvPr/>
+        </p:nvSpPr>
+        <p:spPr>
+          <a:xfrm>
+            <a:off x="3507400" y="831011"/>
+            <a:ext cx="486671" cy="2978087"/>
+          </a:xfrm>
+          <a:prstGeom prst="roundRect">
+            <a:avLst/>
+          </a:prstGeom>
+          <a:noFill/>
+          <a:ln w="28575" cap="flat" cmpd="sng" algn="ctr">
+            <a:solidFill>
+              <a:schemeClr val="accent5"/>
+            </a:solidFill>
+            <a:prstDash val="solid"/>
+            <a:round/>
+            <a:headEnd type="none" w="med" len="med"/>
+            <a:tailEnd type="none" w="med" len="med"/>
+          </a:ln>
+        </p:spPr>
+        <p:style>
+          <a:lnRef idx="0">
+            <a:scrgbClr r="0" g="0" b="0"/>
+          </a:lnRef>
+          <a:fillRef idx="0">
+            <a:scrgbClr r="0" g="0" b="0"/>
+          </a:fillRef>
+          <a:effectRef idx="0">
+            <a:scrgbClr r="0" g="0" b="0"/>
+          </a:effectRef>
+          <a:fontRef idx="minor">
+            <a:schemeClr val="accent1"/>
+          </a:fontRef>
+        </p:style>
+        <p:txBody>
+          <a:bodyPr rtlCol="0" anchor="ctr"/>
+          <a:lstStyle/>
+          <a:p>
+            <a:pPr algn="ctr"/>
+            <a:endParaRPr lang="en-US"/>
+          </a:p>
+        </p:txBody>
+      </p:sp>
       <mc:AlternateContent xmlns:mc="http://schemas.openxmlformats.org/markup-compatibility/2006">
         <mc:Choice xmlns:a14="http://schemas.microsoft.com/office/drawing/2010/main" Requires="a14">
           <p:sp>
             <p:nvSpPr>
-              <p:cNvPr id="71" name="CasellaDiTesto 70">
+              <p:cNvPr id="70" name="CasellaDiTesto 69">
                 <a:extLst>
                   <a:ext uri="{FF2B5EF4-FFF2-40B4-BE49-F238E27FC236}">
-                    <a16:creationId xmlns:a16="http://schemas.microsoft.com/office/drawing/2014/main" id="{AF8BB8EE-BC7C-0F8F-AD3C-5A7C6105108A}"/>
+                    <a16:creationId xmlns:a16="http://schemas.microsoft.com/office/drawing/2014/main" id="{7BEC0685-ABCF-C2F8-1D34-7907D9784E9F}"/>
                   </a:ext>
                 </a:extLst>
               </p:cNvPr>
@@ -6082,34 +6281,197 @@
             </p:nvSpPr>
             <p:spPr>
               <a:xfrm>
-                <a:off x="5968669" y="525133"/>
-                <a:ext cx="2054537" cy="584775"/>
+                <a:off x="4559548" y="3370485"/>
+                <a:ext cx="3348616" cy="707886"/>
               </a:xfrm>
               <a:prstGeom prst="rect">
                 <a:avLst/>
               </a:prstGeom>
               <a:noFill/>
+              <a:ln w="28575">
+                <a:solidFill>
+                  <a:schemeClr val="accent5"/>
+                </a:solidFill>
+              </a:ln>
             </p:spPr>
+            <p:style>
+              <a:lnRef idx="0">
+                <a:scrgbClr r="0" g="0" b="0"/>
+              </a:lnRef>
+              <a:fillRef idx="0">
+                <a:scrgbClr r="0" g="0" b="0"/>
+              </a:fillRef>
+              <a:effectRef idx="0">
+                <a:scrgbClr r="0" g="0" b="0"/>
+              </a:effectRef>
+              <a:fontRef idx="minor">
+                <a:schemeClr val="accent1"/>
+              </a:fontRef>
+            </p:style>
             <p:txBody>
-              <a:bodyPr wrap="none" rtlCol="0">
+              <a:bodyPr wrap="square" rtlCol="0">
                 <a:spAutoFit/>
               </a:bodyPr>
               <a:lstStyle/>
               <a:p>
+                <a:r>
+                  <a:rPr lang="en-US" sz="2000" dirty="0">
+                    <a:ln w="0"/>
+                    <a:solidFill>
+                      <a:schemeClr val="accent5"/>
+                    </a:solidFill>
+                    <a:effectLst>
+                      <a:outerShdw blurRad="38100" dist="25400" dir="5400000" algn="ctr" rotWithShape="0">
+                        <a:srgbClr val="6E747A">
+                          <a:alpha val="43000"/>
+                        </a:srgbClr>
+                      </a:outerShdw>
+                    </a:effectLst>
+                  </a:rPr>
+                  <a:t>Number of hidden neurons:</a:t>
+                </a:r>
+                <a:endParaRPr lang="it-IT" sz="2000" b="0" i="1" dirty="0">
+                  <a:ln w="0"/>
+                  <a:solidFill>
+                    <a:schemeClr val="accent5"/>
+                  </a:solidFill>
+                  <a:effectLst>
+                    <a:outerShdw blurRad="38100" dist="25400" dir="5400000" algn="ctr" rotWithShape="0">
+                      <a:srgbClr val="6E747A">
+                        <a:alpha val="43000"/>
+                      </a:srgbClr>
+                    </a:outerShdw>
+                  </a:effectLst>
+                  <a:latin typeface="Cambria Math" panose="02040503050406030204" pitchFamily="18" charset="0"/>
+                  <a:ea typeface="Cambria Math" panose="02040503050406030204" pitchFamily="18" charset="0"/>
+                </a:endParaRPr>
+              </a:p>
+              <a:p>
                 <a14:m>
-                  <m:oMath xmlns:m="http://schemas.openxmlformats.org/officeDocument/2006/math">
-                    <m:r>
-                      <a:rPr lang="it-IT" sz="3200" i="1">
-                        <a:latin typeface="Cambria Math" panose="02040503050406030204" pitchFamily="18" charset="0"/>
-                      </a:rPr>
-                      <m:t>𝐶𝑊</m:t>
-                    </m:r>
-                  </m:oMath>
+                  <m:oMathPara xmlns:m="http://schemas.openxmlformats.org/officeDocument/2006/math">
+                    <m:oMathParaPr>
+                      <m:jc m:val="centerGroup"/>
+                    </m:oMathParaPr>
+                    <m:oMath xmlns:m="http://schemas.openxmlformats.org/officeDocument/2006/math">
+                      <m:r>
+                        <a:rPr lang="it-IT" sz="2000" b="0" i="1" smtClean="0">
+                          <a:ln w="0"/>
+                          <a:solidFill>
+                            <a:schemeClr val="accent5"/>
+                          </a:solidFill>
+                          <a:effectLst>
+                            <a:outerShdw blurRad="38100" dist="25400" dir="5400000" algn="ctr" rotWithShape="0">
+                              <a:srgbClr val="6E747A">
+                                <a:alpha val="43000"/>
+                              </a:srgbClr>
+                            </a:outerShdw>
+                          </a:effectLst>
+                          <a:latin typeface="Cambria Math" panose="02040503050406030204" pitchFamily="18" charset="0"/>
+                          <a:ea typeface="Cambria Math" panose="02040503050406030204" pitchFamily="18" charset="0"/>
+                        </a:rPr>
+                        <m:t>∝</m:t>
+                      </m:r>
+                      <m:r>
+                        <a:rPr lang="it-IT" sz="2000" b="0" i="1" smtClean="0">
+                          <a:ln w="0"/>
+                          <a:solidFill>
+                            <a:schemeClr val="accent5"/>
+                          </a:solidFill>
+                          <a:effectLst>
+                            <a:outerShdw blurRad="38100" dist="25400" dir="5400000" algn="ctr" rotWithShape="0">
+                              <a:srgbClr val="6E747A">
+                                <a:alpha val="43000"/>
+                              </a:srgbClr>
+                            </a:outerShdw>
+                          </a:effectLst>
+                          <a:latin typeface="Cambria Math" panose="02040503050406030204" pitchFamily="18" charset="0"/>
+                        </a:rPr>
+                        <m:t>2(</m:t>
+                      </m:r>
+                      <m:r>
+                        <a:rPr lang="it-IT" sz="2000" b="0" i="1" smtClean="0">
+                          <a:ln w="0"/>
+                          <a:solidFill>
+                            <a:schemeClr val="accent5"/>
+                          </a:solidFill>
+                          <a:effectLst>
+                            <a:outerShdw blurRad="38100" dist="25400" dir="5400000" algn="ctr" rotWithShape="0">
+                              <a:srgbClr val="6E747A">
+                                <a:alpha val="43000"/>
+                              </a:srgbClr>
+                            </a:outerShdw>
+                          </a:effectLst>
+                          <a:latin typeface="Cambria Math" panose="02040503050406030204" pitchFamily="18" charset="0"/>
+                        </a:rPr>
+                        <m:t>𝑁</m:t>
+                      </m:r>
+                      <m:r>
+                        <a:rPr lang="it-IT" sz="2000" b="0" i="1" smtClean="0">
+                          <a:ln w="0"/>
+                          <a:solidFill>
+                            <a:schemeClr val="accent5"/>
+                          </a:solidFill>
+                          <a:effectLst>
+                            <a:outerShdw blurRad="38100" dist="25400" dir="5400000" algn="ctr" rotWithShape="0">
+                              <a:srgbClr val="6E747A">
+                                <a:alpha val="43000"/>
+                              </a:srgbClr>
+                            </a:outerShdw>
+                          </a:effectLst>
+                          <a:latin typeface="Cambria Math" panose="02040503050406030204" pitchFamily="18" charset="0"/>
+                        </a:rPr>
+                        <m:t>−</m:t>
+                      </m:r>
+                      <m:r>
+                        <a:rPr lang="it-IT" sz="2000" b="0" i="1" smtClean="0">
+                          <a:ln w="0"/>
+                          <a:solidFill>
+                            <a:schemeClr val="accent5"/>
+                          </a:solidFill>
+                          <a:effectLst>
+                            <a:outerShdw blurRad="38100" dist="25400" dir="5400000" algn="ctr" rotWithShape="0">
+                              <a:srgbClr val="6E747A">
+                                <a:alpha val="43000"/>
+                              </a:srgbClr>
+                            </a:outerShdw>
+                          </a:effectLst>
+                          <a:latin typeface="Cambria Math" panose="02040503050406030204" pitchFamily="18" charset="0"/>
+                        </a:rPr>
+                        <m:t>𝑖</m:t>
+                      </m:r>
+                      <m:r>
+                        <a:rPr lang="it-IT" sz="2000" b="0" i="1" smtClean="0">
+                          <a:ln w="0"/>
+                          <a:solidFill>
+                            <a:schemeClr val="accent5"/>
+                          </a:solidFill>
+                          <a:effectLst>
+                            <a:outerShdw blurRad="38100" dist="25400" dir="5400000" algn="ctr" rotWithShape="0">
+                              <a:srgbClr val="6E747A">
+                                <a:alpha val="43000"/>
+                              </a:srgbClr>
+                            </a:outerShdw>
+                          </a:effectLst>
+                          <a:latin typeface="Cambria Math" panose="02040503050406030204" pitchFamily="18" charset="0"/>
+                        </a:rPr>
+                        <m:t>)</m:t>
+                      </m:r>
+                    </m:oMath>
+                  </m:oMathPara>
                 </a14:m>
-                <a:r>
-                  <a:rPr lang="en-US" sz="3200" dirty="0"/>
-                  <a:t> (exact)</a:t>
-                </a:r>
+                <a:endParaRPr lang="en-US" sz="2000" dirty="0">
+                  <a:ln w="0"/>
+                  <a:solidFill>
+                    <a:schemeClr val="accent5"/>
+                  </a:solidFill>
+                  <a:effectLst>
+                    <a:outerShdw blurRad="38100" dist="25400" dir="5400000" algn="ctr" rotWithShape="0">
+                      <a:srgbClr val="6E747A">
+                        <a:alpha val="43000"/>
+                      </a:srgbClr>
+                    </a:outerShdw>
+                  </a:effectLst>
+                </a:endParaRPr>
               </a:p>
             </p:txBody>
           </p:sp>
@@ -6117,10 +6479,10 @@
         <mc:Fallback>
           <p:sp>
             <p:nvSpPr>
-              <p:cNvPr id="71" name="CasellaDiTesto 70">
+              <p:cNvPr id="70" name="CasellaDiTesto 69">
                 <a:extLst>
                   <a:ext uri="{FF2B5EF4-FFF2-40B4-BE49-F238E27FC236}">
-                    <a16:creationId xmlns:a16="http://schemas.microsoft.com/office/drawing/2014/main" id="{AF8BB8EE-BC7C-0F8F-AD3C-5A7C6105108A}"/>
+                    <a16:creationId xmlns:a16="http://schemas.microsoft.com/office/drawing/2014/main" id="{7BEC0685-ABCF-C2F8-1D34-7907D9784E9F}"/>
                   </a:ext>
                 </a:extLst>
               </p:cNvPr>
@@ -6131,8 +6493,8 @@
             </p:nvSpPr>
             <p:spPr>
               <a:xfrm>
-                <a:off x="5968669" y="525133"/>
-                <a:ext cx="2054537" cy="584775"/>
+                <a:off x="4559548" y="3370485"/>
+                <a:ext cx="3348616" cy="707886"/>
               </a:xfrm>
               <a:prstGeom prst="rect">
                 <a:avLst/>
@@ -6140,9 +6502,14 @@
               <a:blipFill>
                 <a:blip r:embed="rId4"/>
                 <a:stretch>
-                  <a:fillRect l="-1840" t="-12766" r="-6748" b="-31915"/>
+                  <a:fillRect l="-2256" t="-3390" b="-8475"/>
                 </a:stretch>
               </a:blipFill>
+              <a:ln w="28575">
+                <a:solidFill>
+                  <a:schemeClr val="accent5"/>
+                </a:solidFill>
+              </a:ln>
             </p:spPr>
             <p:txBody>
               <a:bodyPr/>
@@ -6159,123 +6526,50 @@
           </p:sp>
         </mc:Fallback>
       </mc:AlternateContent>
-      <mc:AlternateContent xmlns:mc="http://schemas.openxmlformats.org/markup-compatibility/2006">
-        <mc:Choice xmlns:a14="http://schemas.microsoft.com/office/drawing/2010/main" Requires="a14">
-          <p:sp>
-            <p:nvSpPr>
-              <p:cNvPr id="79" name="CasellaDiTesto 78">
-                <a:extLst>
-                  <a:ext uri="{FF2B5EF4-FFF2-40B4-BE49-F238E27FC236}">
-                    <a16:creationId xmlns:a16="http://schemas.microsoft.com/office/drawing/2014/main" id="{CA9C32B8-D382-93BA-2BDC-FBE7E635F0A9}"/>
-                  </a:ext>
-                </a:extLst>
-              </p:cNvPr>
-              <p:cNvSpPr txBox="1"/>
-              <p:nvPr/>
-            </p:nvSpPr>
-            <p:spPr>
-              <a:xfrm>
-                <a:off x="6464550" y="4229191"/>
-                <a:ext cx="1232453" cy="584775"/>
-              </a:xfrm>
-              <a:prstGeom prst="rect">
-                <a:avLst/>
-              </a:prstGeom>
-              <a:noFill/>
-            </p:spPr>
-            <p:txBody>
-              <a:bodyPr wrap="none" rtlCol="0">
-                <a:spAutoFit/>
-              </a:bodyPr>
-              <a:lstStyle/>
-              <a:p>
-                <a14:m>
-                  <m:oMathPara xmlns:m="http://schemas.openxmlformats.org/officeDocument/2006/math">
-                    <m:oMathParaPr>
-                      <m:jc m:val="centerGroup"/>
-                    </m:oMathParaPr>
-                    <m:oMath xmlns:m="http://schemas.openxmlformats.org/officeDocument/2006/math">
-                      <m:sSup>
-                        <m:sSupPr>
-                          <m:ctrlPr>
-                            <a:rPr lang="it-IT" sz="3200" i="1">
-                              <a:latin typeface="Cambria Math" panose="02040503050406030204" pitchFamily="18" charset="0"/>
-                              <a:ea typeface="Cambria Math" panose="02040503050406030204" pitchFamily="18" charset="0"/>
-                            </a:rPr>
-                          </m:ctrlPr>
-                        </m:sSupPr>
-                        <m:e>
-                          <m:r>
-                            <a:rPr lang="it-IT" sz="3200" i="1">
-                              <a:latin typeface="Cambria Math" panose="02040503050406030204" pitchFamily="18" charset="0"/>
-                              <a:ea typeface="Cambria Math" panose="02040503050406030204" pitchFamily="18" charset="0"/>
-                            </a:rPr>
-                            <m:t>𝐶𝑊</m:t>
-                          </m:r>
-                        </m:e>
-                        <m:sup>
-                          <m:r>
-                            <a:rPr lang="it-IT" sz="3200" i="1">
-                              <a:latin typeface="Cambria Math" panose="02040503050406030204" pitchFamily="18" charset="0"/>
-                              <a:ea typeface="Cambria Math" panose="02040503050406030204" pitchFamily="18" charset="0"/>
-                            </a:rPr>
-                            <m:t>∞</m:t>
-                          </m:r>
-                        </m:sup>
-                      </m:sSup>
-                    </m:oMath>
-                  </m:oMathPara>
-                </a14:m>
-                <a:endParaRPr lang="en-US" sz="3200" dirty="0"/>
-              </a:p>
-            </p:txBody>
-          </p:sp>
-        </mc:Choice>
-        <mc:Fallback>
-          <p:sp>
-            <p:nvSpPr>
-              <p:cNvPr id="79" name="CasellaDiTesto 78">
-                <a:extLst>
-                  <a:ext uri="{FF2B5EF4-FFF2-40B4-BE49-F238E27FC236}">
-                    <a16:creationId xmlns:a16="http://schemas.microsoft.com/office/drawing/2014/main" id="{CA9C32B8-D382-93BA-2BDC-FBE7E635F0A9}"/>
-                  </a:ext>
-                </a:extLst>
-              </p:cNvPr>
-              <p:cNvSpPr txBox="1">
-                <a:spLocks noRot="1" noChangeAspect="1" noMove="1" noResize="1" noEditPoints="1" noAdjustHandles="1" noChangeArrowheads="1" noChangeShapeType="1" noTextEdit="1"/>
-              </p:cNvSpPr>
-              <p:nvPr/>
-            </p:nvSpPr>
-            <p:spPr>
-              <a:xfrm>
-                <a:off x="6464550" y="4229191"/>
-                <a:ext cx="1232453" cy="584775"/>
-              </a:xfrm>
-              <a:prstGeom prst="rect">
-                <a:avLst/>
-              </a:prstGeom>
-              <a:blipFill>
-                <a:blip r:embed="rId5"/>
-                <a:stretch>
-                  <a:fillRect/>
-                </a:stretch>
-              </a:blipFill>
-            </p:spPr>
-            <p:txBody>
-              <a:bodyPr/>
-              <a:lstStyle/>
-              <a:p>
-                <a:r>
-                  <a:rPr lang="en-US">
-                    <a:noFill/>
-                  </a:rPr>
-                  <a:t> </a:t>
-                </a:r>
-              </a:p>
-            </p:txBody>
-          </p:sp>
-        </mc:Fallback>
-      </mc:AlternateContent>
+      <p:cxnSp>
+        <p:nvCxnSpPr>
+          <p:cNvPr id="72" name="Connettore 1 71">
+            <a:extLst>
+              <a:ext uri="{FF2B5EF4-FFF2-40B4-BE49-F238E27FC236}">
+                <a16:creationId xmlns:a16="http://schemas.microsoft.com/office/drawing/2014/main" id="{FD7DEC9B-FCC7-BD88-5F00-A2C33EB9AE84}"/>
+              </a:ext>
+            </a:extLst>
+          </p:cNvPr>
+          <p:cNvCxnSpPr>
+            <a:cxnSpLocks/>
+            <a:endCxn id="70" idx="1"/>
+          </p:cNvCxnSpPr>
+          <p:nvPr/>
+        </p:nvCxnSpPr>
+        <p:spPr>
+          <a:xfrm>
+            <a:off x="3994071" y="3578213"/>
+            <a:ext cx="565477" cy="146215"/>
+          </a:xfrm>
+          <a:prstGeom prst="line">
+            <a:avLst/>
+          </a:prstGeom>
+          <a:ln w="28575">
+            <a:solidFill>
+              <a:schemeClr val="accent5"/>
+            </a:solidFill>
+          </a:ln>
+        </p:spPr>
+        <p:style>
+          <a:lnRef idx="1">
+            <a:schemeClr val="accent1"/>
+          </a:lnRef>
+          <a:fillRef idx="0">
+            <a:schemeClr val="accent1"/>
+          </a:fillRef>
+          <a:effectRef idx="0">
+            <a:schemeClr val="accent1"/>
+          </a:effectRef>
+          <a:fontRef idx="minor">
+            <a:schemeClr val="tx1"/>
+          </a:fontRef>
+        </p:style>
+      </p:cxnSp>
     </p:spTree>
     <p:extLst>
       <p:ext uri="{BB962C8B-B14F-4D97-AF65-F5344CB8AC3E}">

</xml_diff>